<commit_message>
add arch, pie shapes and charts module with donut chart
</commit_message>
<xml_diff>
--- a/examples/basic.pptx
+++ b/examples/basic.pptx
@@ -3486,10 +3486,10 @@
         </p:nvGrpSpPr>
         <p:grpSpPr>
           <a:xfrm>
-            <a:off x="1196921" y="2160000"/>
-            <a:ext cx="1746158" cy="1773079"/>
-            <a:chOff x="1196921" y="2160000"/>
-            <a:chExt cx="1746158" cy="1773079"/>
+            <a:off x="1009964" y="2160000"/>
+            <a:ext cx="2120071" cy="1960036"/>
+            <a:chOff x="1009964" y="2160000"/>
+            <a:chExt cx="2120071" cy="1960036"/>
           </a:xfrm>
         </p:grpSpPr>
         <p:sp>

</xml_diff>